<commit_message>
Add 07 PPT and Sample
</commit_message>
<xml_diff>
--- a/PPT/05-Accenture-FS-Angular-Component.pptx
+++ b/PPT/05-Accenture-FS-Angular-Component.pptx
@@ -15470,21 +15470,25 @@
                 <a:latin typeface="SimSun" panose="02010600030101010101" pitchFamily="2" charset="-122"/>
                 <a:ea typeface="SimSun" panose="02010600030101010101" pitchFamily="2" charset="-122"/>
               </a:rPr>
-              <a:t>4. </a:t>
-            </a:r>
-            <a:r>
-              <a:rPr lang="en-US" altLang="zh-CN" sz="1600" b="0" dirty="0">
-                <a:latin typeface="SimSun" panose="02010600030101010101" pitchFamily="2" charset="-122"/>
-                <a:ea typeface="SimSun" panose="02010600030101010101" pitchFamily="2" charset="-122"/>
-              </a:rPr>
-              <a:t>Parent listens for child event</a:t>
-            </a:r>
+              <a:t>4. Parent listens for child event</a:t>
+            </a:r>
+          </a:p>
+          <a:p>
             <a:endParaRPr lang="en-US" altLang="zh-CN" sz="1600" b="0" dirty="0">
               <a:latin typeface="SimSun" panose="02010600030101010101" pitchFamily="2" charset="-122"/>
               <a:ea typeface="SimSun" panose="02010600030101010101" pitchFamily="2" charset="-122"/>
             </a:endParaRPr>
           </a:p>
           <a:p>
+            <a:r>
+              <a:rPr lang="en-US" altLang="zh-CN" sz="1600" b="0" dirty="0">
+                <a:latin typeface="SimSun" panose="02010600030101010101" pitchFamily="2" charset="-122"/>
+                <a:ea typeface="SimSun" panose="02010600030101010101" pitchFamily="2" charset="-122"/>
+              </a:rPr>
+              <a:t>5. Parent interacts with child via local variable</a:t>
+            </a:r>
+          </a:p>
+          <a:p>
             <a:endParaRPr lang="en-US" altLang="zh-CN" sz="1600" b="0" dirty="0">
               <a:latin typeface="SimSun" panose="02010600030101010101" pitchFamily="2" charset="-122"/>
               <a:ea typeface="SimSun" panose="02010600030101010101" pitchFamily="2" charset="-122"/>
@@ -15496,40 +15500,7 @@
                 <a:latin typeface="SimSun" panose="02010600030101010101" pitchFamily="2" charset="-122"/>
                 <a:ea typeface="SimSun" panose="02010600030101010101" pitchFamily="2" charset="-122"/>
               </a:rPr>
-              <a:t>5. </a:t>
-            </a:r>
-            <a:r>
-              <a:rPr lang="en-US" altLang="zh-CN" sz="1600" b="0" dirty="0">
-                <a:latin typeface="SimSun" panose="02010600030101010101" pitchFamily="2" charset="-122"/>
-                <a:ea typeface="SimSun" panose="02010600030101010101" pitchFamily="2" charset="-122"/>
-              </a:rPr>
-              <a:t>Parent interacts with child via local variable</a:t>
-            </a:r>
-            <a:endParaRPr lang="en-US" altLang="zh-CN" sz="1600" b="0" dirty="0">
-              <a:latin typeface="SimSun" panose="02010600030101010101" pitchFamily="2" charset="-122"/>
-              <a:ea typeface="SimSun" panose="02010600030101010101" pitchFamily="2" charset="-122"/>
-            </a:endParaRPr>
-          </a:p>
-          <a:p>
-            <a:endParaRPr lang="en-US" altLang="zh-CN" sz="1600" b="0" dirty="0">
-              <a:latin typeface="SimSun" panose="02010600030101010101" pitchFamily="2" charset="-122"/>
-              <a:ea typeface="SimSun" panose="02010600030101010101" pitchFamily="2" charset="-122"/>
-            </a:endParaRPr>
-          </a:p>
-          <a:p>
-            <a:r>
-              <a:rPr lang="en-US" altLang="zh-CN" sz="1600" b="0" dirty="0">
-                <a:latin typeface="SimSun" panose="02010600030101010101" pitchFamily="2" charset="-122"/>
-                <a:ea typeface="SimSun" panose="02010600030101010101" pitchFamily="2" charset="-122"/>
-              </a:rPr>
-              <a:t>6. </a:t>
-            </a:r>
-            <a:r>
-              <a:rPr lang="en-US" altLang="zh-CN" sz="1600" b="0" dirty="0">
-                <a:latin typeface="SimSun" panose="02010600030101010101" pitchFamily="2" charset="-122"/>
-                <a:ea typeface="SimSun" panose="02010600030101010101" pitchFamily="2" charset="-122"/>
-              </a:rPr>
-              <a:t>Parent calls an @</a:t>
+              <a:t>6. Parent calls an @</a:t>
             </a:r>
             <a:r>
               <a:rPr lang="en-US" altLang="zh-CN" sz="1600" b="0" dirty="0" err="1">
@@ -16449,7 +16420,7 @@
           <p:nvPr>
             <p:extLst>
               <p:ext uri="{D42A27DB-BD31-4B8C-83A1-F6EECF244321}">
-                <p14:modId xmlns:p14="http://schemas.microsoft.com/office/powerpoint/2010/main" val="1416513901"/>
+                <p14:modId xmlns:p14="http://schemas.microsoft.com/office/powerpoint/2010/main" val="161812534"/>
               </p:ext>
             </p:extLst>
           </p:nvPr>
@@ -16660,7 +16631,27 @@
                           <a:latin typeface="NSimSun" panose="02010609030101010101" pitchFamily="49" charset="-122"/>
                           <a:ea typeface="NSimSun" panose="02010609030101010101" pitchFamily="49" charset="-122"/>
                         </a:rPr>
-                        <a:t>Component Lifecycle Hooks</a:t>
+                        <a:t>Component</a:t>
+                      </a:r>
+                      <a:r>
+                        <a:rPr lang="zh-CN" altLang="en-US" sz="2400" b="0" dirty="0">
+                          <a:solidFill>
+                            <a:srgbClr val="000000"/>
+                          </a:solidFill>
+                          <a:latin typeface="NSimSun" panose="02010609030101010101" pitchFamily="49" charset="-122"/>
+                          <a:ea typeface="NSimSun" panose="02010609030101010101" pitchFamily="49" charset="-122"/>
+                        </a:rPr>
+                        <a:t>生命周期</a:t>
+                      </a:r>
+                      <a:r>
+                        <a:rPr lang="en-US" altLang="zh-CN" sz="2400" b="0" dirty="0">
+                          <a:solidFill>
+                            <a:srgbClr val="000000"/>
+                          </a:solidFill>
+                          <a:latin typeface="NSimSun" panose="02010609030101010101" pitchFamily="49" charset="-122"/>
+                          <a:ea typeface="NSimSun" panose="02010609030101010101" pitchFamily="49" charset="-122"/>
+                        </a:rPr>
+                        <a:t> </a:t>
                       </a:r>
                     </a:p>
                     <a:p>
@@ -21281,15 +21272,18 @@
                 <a:latin typeface="NSimSun" panose="02010609030101010101" pitchFamily="49" charset="-122"/>
                 <a:ea typeface="NSimSun" panose="02010609030101010101" pitchFamily="49" charset="-122"/>
               </a:rPr>
-              <a:t>Component Lifecycle Hooks </a:t>
-            </a:r>
-            <a:endParaRPr lang="zh-CN" altLang="en-US" sz="2800" b="0" dirty="0">
-              <a:solidFill>
-                <a:srgbClr val="000000"/>
-              </a:solidFill>
-              <a:latin typeface="NSimSun" panose="02010609030101010101" pitchFamily="49" charset="-122"/>
-              <a:ea typeface="NSimSun" panose="02010609030101010101" pitchFamily="49" charset="-122"/>
-            </a:endParaRPr>
+              <a:t>Component</a:t>
+            </a:r>
+            <a:r>
+              <a:rPr lang="zh-CN" altLang="en-US" sz="2800" b="0" dirty="0">
+                <a:solidFill>
+                  <a:srgbClr val="000000"/>
+                </a:solidFill>
+                <a:latin typeface="NSimSun" panose="02010609030101010101" pitchFamily="49" charset="-122"/>
+                <a:ea typeface="NSimSun" panose="02010609030101010101" pitchFamily="49" charset="-122"/>
+              </a:rPr>
+              <a:t>生命周期</a:t>
+            </a:r>
           </a:p>
         </p:txBody>
       </p:sp>
@@ -21874,14 +21868,7 @@
                 <a:latin typeface="SimSun" panose="02010600030101010101" pitchFamily="2" charset="-122"/>
                 <a:ea typeface="SimSun" panose="02010600030101010101" pitchFamily="2" charset="-122"/>
               </a:rPr>
-              <a:t>后</a:t>
-            </a:r>
-            <a:r>
-              <a:rPr lang="zh-CN" altLang="en-US" sz="1200" b="0" dirty="0">
-                <a:latin typeface="SimSun" panose="02010600030101010101" pitchFamily="2" charset="-122"/>
-                <a:ea typeface="SimSun" panose="02010600030101010101" pitchFamily="2" charset="-122"/>
-              </a:rPr>
-              <a:t>只调用一次</a:t>
+              <a:t>后只调用一次</a:t>
             </a:r>
             <a:r>
               <a:rPr lang="en-US" sz="1200" b="0" dirty="0">
@@ -22021,14 +22008,7 @@
                 <a:latin typeface="SimSun" panose="02010600030101010101" pitchFamily="2" charset="-122"/>
                 <a:ea typeface="SimSun" panose="02010600030101010101" pitchFamily="2" charset="-122"/>
               </a:rPr>
-              <a:t>子循环都会触发，也是</a:t>
-            </a:r>
-            <a:r>
-              <a:rPr lang="zh-CN" altLang="en-US" sz="1200" b="0" dirty="0">
-                <a:latin typeface="SimSun" panose="02010600030101010101" pitchFamily="2" charset="-122"/>
-                <a:ea typeface="SimSun" panose="02010600030101010101" pitchFamily="2" charset="-122"/>
-              </a:rPr>
-              <a:t>尽量少用</a:t>
+              <a:t>子循环都会触发，也是尽量少用</a:t>
             </a:r>
             <a:r>
               <a:rPr lang="en-US" sz="1200" b="0" dirty="0">
@@ -23334,12 +23314,19 @@
 </file>
 
 <file path=customXml/item1.xml><?xml version="1.0" encoding="utf-8"?>
-<?mso-contentType ?>
-<FormTemplates xmlns="http://schemas.microsoft.com/sharepoint/v3/contenttype/forms">
-  <Display>DocumentLibraryForm</Display>
-  <Edit>DocumentLibraryForm</Edit>
-  <New>DocumentLibraryForm</New>
-</FormTemplates>
+<p:properties xmlns:p="http://schemas.microsoft.com/office/2006/metadata/properties" xmlns:xsi="http://www.w3.org/2001/XMLSchema-instance" xmlns:pc="http://schemas.microsoft.com/office/infopath/2007/PartnerControls">
+  <documentManagement>
+    <TemplateUrl xmlns="http://schemas.microsoft.com/sharepoint/v3" xsi:nil="true"/>
+    <_SourceUrl xmlns="http://schemas.microsoft.com/sharepoint/v3" xsi:nil="true"/>
+    <Comments0 xmlns="C6B13D8A-F6C8-4777-9906-93DFDA163C9A" xsi:nil="true"/>
+    <xd_ProgID xmlns="http://schemas.microsoft.com/sharepoint/v3" xsi:nil="true"/>
+    <test xmlns="C6B13D8A-F6C8-4777-9906-93DFDA163C9A" xsi:nil="true"/>
+    <Order xmlns="http://schemas.microsoft.com/sharepoint/v3" xsi:nil="true"/>
+    <_SharedFileIndex xmlns="http://schemas.microsoft.com/sharepoint/v3" xsi:nil="true"/>
+    <MetaInfo xmlns="http://schemas.microsoft.com/sharepoint/v3" xsi:nil="true"/>
+    <ContentTypeId xmlns="http://schemas.microsoft.com/sharepoint/v3">0x0101008A3DB1C6C8F67747990693DFDA163C9A</ContentTypeId>
+  </documentManagement>
+</p:properties>
 </file>
 
 <file path=customXml/item2.xml><?xml version="1.0" encoding="utf-8"?>
@@ -23814,25 +23801,27 @@
 </file>
 
 <file path=customXml/item3.xml><?xml version="1.0" encoding="utf-8"?>
-<p:properties xmlns:p="http://schemas.microsoft.com/office/2006/metadata/properties" xmlns:xsi="http://www.w3.org/2001/XMLSchema-instance" xmlns:pc="http://schemas.microsoft.com/office/infopath/2007/PartnerControls">
-  <documentManagement>
-    <TemplateUrl xmlns="http://schemas.microsoft.com/sharepoint/v3" xsi:nil="true"/>
-    <_SourceUrl xmlns="http://schemas.microsoft.com/sharepoint/v3" xsi:nil="true"/>
-    <Comments0 xmlns="C6B13D8A-F6C8-4777-9906-93DFDA163C9A" xsi:nil="true"/>
-    <xd_ProgID xmlns="http://schemas.microsoft.com/sharepoint/v3" xsi:nil="true"/>
-    <test xmlns="C6B13D8A-F6C8-4777-9906-93DFDA163C9A" xsi:nil="true"/>
-    <Order xmlns="http://schemas.microsoft.com/sharepoint/v3" xsi:nil="true"/>
-    <_SharedFileIndex xmlns="http://schemas.microsoft.com/sharepoint/v3" xsi:nil="true"/>
-    <MetaInfo xmlns="http://schemas.microsoft.com/sharepoint/v3" xsi:nil="true"/>
-    <ContentTypeId xmlns="http://schemas.microsoft.com/sharepoint/v3">0x0101008A3DB1C6C8F67747990693DFDA163C9A</ContentTypeId>
-  </documentManagement>
-</p:properties>
+<?mso-contentType ?>
+<FormTemplates xmlns="http://schemas.microsoft.com/sharepoint/v3/contenttype/forms">
+  <Display>DocumentLibraryForm</Display>
+  <Edit>DocumentLibraryForm</Edit>
+  <New>DocumentLibraryForm</New>
+</FormTemplates>
 </file>
 
 <file path=customXml/itemProps1.xml><?xml version="1.0" encoding="utf-8"?>
-<ds:datastoreItem xmlns:ds="http://schemas.openxmlformats.org/officeDocument/2006/customXml" ds:itemID="{6268566E-43AA-4A68-BD58-84AB4DF5B82A}">
+<ds:datastoreItem xmlns:ds="http://schemas.openxmlformats.org/officeDocument/2006/customXml" ds:itemID="{F59E41AE-6836-4572-AAEF-EE3E09D690B6}">
   <ds:schemaRefs>
-    <ds:schemaRef ds:uri="http://schemas.microsoft.com/sharepoint/v3/contenttype/forms"/>
+    <ds:schemaRef ds:uri="http://schemas.microsoft.com/office/2006/documentManagement/types"/>
+    <ds:schemaRef ds:uri="http://schemas.microsoft.com/sharepoint/v3"/>
+    <ds:schemaRef ds:uri="http://purl.org/dc/elements/1.1/"/>
+    <ds:schemaRef ds:uri="http://purl.org/dc/dcmitype/"/>
+    <ds:schemaRef ds:uri="http://purl.org/dc/terms/"/>
+    <ds:schemaRef ds:uri="C6B13D8A-F6C8-4777-9906-93DFDA163C9A"/>
+    <ds:schemaRef ds:uri="http://schemas.microsoft.com/office/2006/metadata/properties"/>
+    <ds:schemaRef ds:uri="http://schemas.microsoft.com/office/infopath/2007/PartnerControls"/>
+    <ds:schemaRef ds:uri="http://schemas.openxmlformats.org/package/2006/metadata/core-properties"/>
+    <ds:schemaRef ds:uri="http://www.w3.org/XML/1998/namespace"/>
   </ds:schemaRefs>
 </ds:datastoreItem>
 </file>
@@ -23857,18 +23846,9 @@
 </file>
 
 <file path=customXml/itemProps3.xml><?xml version="1.0" encoding="utf-8"?>
-<ds:datastoreItem xmlns:ds="http://schemas.openxmlformats.org/officeDocument/2006/customXml" ds:itemID="{F59E41AE-6836-4572-AAEF-EE3E09D690B6}">
+<ds:datastoreItem xmlns:ds="http://schemas.openxmlformats.org/officeDocument/2006/customXml" ds:itemID="{6268566E-43AA-4A68-BD58-84AB4DF5B82A}">
   <ds:schemaRefs>
-    <ds:schemaRef ds:uri="http://schemas.microsoft.com/office/2006/documentManagement/types"/>
-    <ds:schemaRef ds:uri="http://schemas.microsoft.com/sharepoint/v3"/>
-    <ds:schemaRef ds:uri="http://purl.org/dc/elements/1.1/"/>
-    <ds:schemaRef ds:uri="http://purl.org/dc/dcmitype/"/>
-    <ds:schemaRef ds:uri="http://purl.org/dc/terms/"/>
-    <ds:schemaRef ds:uri="C6B13D8A-F6C8-4777-9906-93DFDA163C9A"/>
-    <ds:schemaRef ds:uri="http://schemas.microsoft.com/office/2006/metadata/properties"/>
-    <ds:schemaRef ds:uri="http://schemas.microsoft.com/office/infopath/2007/PartnerControls"/>
-    <ds:schemaRef ds:uri="http://schemas.openxmlformats.org/package/2006/metadata/core-properties"/>
-    <ds:schemaRef ds:uri="http://www.w3.org/XML/1998/namespace"/>
+    <ds:schemaRef ds:uri="http://schemas.microsoft.com/sharepoint/v3/contenttype/forms"/>
   </ds:schemaRefs>
 </ds:datastoreItem>
 </file>
</xml_diff>